<commit_message>
fix: corrigir overflow texto slide 25 (Exercicio 6)
Removidas linhas vazias separadoras, reduzida fonte 20->18pt e
espacamento 8->4pt no slide de exercicio que tinha texto cortado
pelo rodape. Validacao: zero overlaps em todos 34 slides.

Co-Authored-By: Claude Opus 4.6 <noreply@anthropic.com>
</commit_message>
<xml_diff>
--- a/APRESENTACAO_CURSO_IA_ADVOCACIA_v5.pptx
+++ b/APRESENTACAO_CURSO_IA_ADVOCACIA_v5.pptx
@@ -10564,13 +10564,13 @@
           <a:p>
             <a:pPr>
               <a:spcAft>
-                <a:spcPts val="800"/>
+                <a:spcPts val="400"/>
               </a:spcAft>
             </a:pPr>
             <a:r>
-              <a:rPr sz="2000">
-                <a:solidFill>
-                  <a:srgbClr val="4A4A4A"/>
+              <a:rPr lang="pt-BR" sz="1800" b="1" dirty="0">
+                <a:solidFill>
+                  <a:srgbClr val="333333"/>
                 </a:solidFill>
               </a:rPr>
               <a:t>ETAPA 1 — PESQUISA (12 min)</a:t>
@@ -10579,13 +10579,13 @@
           <a:p>
             <a:pPr>
               <a:spcAft>
-                <a:spcPts val="800"/>
+                <a:spcPts val="400"/>
               </a:spcAft>
             </a:pPr>
             <a:r>
-              <a:rPr sz="2000">
-                <a:solidFill>
-                  <a:srgbClr val="4A4A4A"/>
+              <a:rPr lang="pt-BR" sz="1800" b="0" dirty="0">
+                <a:solidFill>
+                  <a:srgbClr val="333333"/>
                 </a:solidFill>
               </a:rPr>
               <a:t>  Pesquisar jurisprudencia de defesa com Protocolo</a:t>
@@ -10594,13 +10594,13 @@
           <a:p>
             <a:pPr>
               <a:spcAft>
-                <a:spcPts val="800"/>
+                <a:spcPts val="400"/>
               </a:spcAft>
             </a:pPr>
             <a:r>
-              <a:rPr sz="2000">
-                <a:solidFill>
-                  <a:srgbClr val="4A4A4A"/>
+              <a:rPr lang="pt-BR" sz="1800" b="0" dirty="0">
+                <a:solidFill>
+                  <a:srgbClr val="333333"/>
                 </a:solidFill>
               </a:rPr>
               <a:t>  Busca -&gt; Link -&gt; Thinking -&gt; Checagem</a:t>
@@ -10609,109 +10609,97 @@
           <a:p>
             <a:pPr>
               <a:spcAft>
-                <a:spcPts val="800"/>
+                <a:spcPts val="400"/>
+              </a:spcAft>
+              <a:spcBef>
+                <a:spcPts val="1000"/>
+              </a:spcBef>
+            </a:pPr>
+            <a:r>
+              <a:rPr lang="pt-BR" sz="1800" b="1" dirty="0">
+                <a:solidFill>
+                  <a:srgbClr val="333333"/>
+                </a:solidFill>
+              </a:rPr>
+              <a:t>ETAPA 2 — MINUTA (18 min)</a:t>
+            </a:r>
+          </a:p>
+          <a:p>
+            <a:pPr>
+              <a:spcAft>
+                <a:spcPts val="400"/>
               </a:spcAft>
             </a:pPr>
+            <a:r>
+              <a:rPr lang="pt-BR" sz="1800" b="0" dirty="0">
+                <a:solidFill>
+                  <a:srgbClr val="333333"/>
+                </a:solidFill>
+              </a:rPr>
+              <a:t>  Gerar contestacao aplicando CLEAR</a:t>
+            </a:r>
           </a:p>
           <a:p>
             <a:pPr>
               <a:spcAft>
-                <a:spcPts val="800"/>
+                <a:spcPts val="400"/>
               </a:spcAft>
             </a:pPr>
             <a:r>
-              <a:rPr sz="2000">
-                <a:solidFill>
-                  <a:srgbClr val="4A4A4A"/>
-                </a:solidFill>
-              </a:rPr>
-              <a:t>ETAPA 2 — MINUTA (18 min)</a:t>
+              <a:rPr lang="pt-BR" sz="1800" b="0" dirty="0">
+                <a:solidFill>
+                  <a:srgbClr val="333333"/>
+                </a:solidFill>
+              </a:rPr>
+              <a:t>  Impugnar ponto a ponto</a:t>
             </a:r>
           </a:p>
           <a:p>
             <a:pPr>
               <a:spcAft>
-                <a:spcPts val="800"/>
+                <a:spcPts val="400"/>
+              </a:spcAft>
+              <a:spcBef>
+                <a:spcPts val="1000"/>
+              </a:spcBef>
+            </a:pPr>
+            <a:r>
+              <a:rPr lang="pt-BR" sz="1800" b="1" dirty="0">
+                <a:solidFill>
+                  <a:srgbClr val="333333"/>
+                </a:solidFill>
+              </a:rPr>
+              <a:t>ETAPA 3 — VERIFICACAO (10 min)</a:t>
+            </a:r>
+          </a:p>
+          <a:p>
+            <a:pPr>
+              <a:spcAft>
+                <a:spcPts val="400"/>
               </a:spcAft>
             </a:pPr>
             <a:r>
-              <a:rPr sz="2000">
-                <a:solidFill>
-                  <a:srgbClr val="4A4A4A"/>
-                </a:solidFill>
-              </a:rPr>
-              <a:t>  Gerar contestacao aplicando CLEAR</a:t>
+              <a:rPr lang="pt-BR" sz="1800" b="0" dirty="0">
+                <a:solidFill>
+                  <a:srgbClr val="333333"/>
+                </a:solidFill>
+              </a:rPr>
+              <a:t>  Checar links, pedir autochecagem, revisar</a:t>
             </a:r>
           </a:p>
           <a:p>
             <a:pPr>
               <a:spcAft>
-                <a:spcPts val="800"/>
+                <a:spcPts val="400"/>
               </a:spcAft>
+              <a:spcBef>
+                <a:spcPts val="1000"/>
+              </a:spcBef>
             </a:pPr>
             <a:r>
-              <a:rPr sz="2000">
-                <a:solidFill>
-                  <a:srgbClr val="4A4A4A"/>
-                </a:solidFill>
-              </a:rPr>
-              <a:t>  Impugnar ponto a ponto</a:t>
-            </a:r>
-          </a:p>
-          <a:p>
-            <a:pPr>
-              <a:spcAft>
-                <a:spcPts val="800"/>
-              </a:spcAft>
-            </a:pPr>
-          </a:p>
-          <a:p>
-            <a:pPr>
-              <a:spcAft>
-                <a:spcPts val="800"/>
-              </a:spcAft>
-            </a:pPr>
-            <a:r>
-              <a:rPr sz="2000">
-                <a:solidFill>
-                  <a:srgbClr val="4A4A4A"/>
-                </a:solidFill>
-              </a:rPr>
-              <a:t>ETAPA 3 — VERIFICACAO (10 min)</a:t>
-            </a:r>
-          </a:p>
-          <a:p>
-            <a:pPr>
-              <a:spcAft>
-                <a:spcPts val="800"/>
-              </a:spcAft>
-            </a:pPr>
-            <a:r>
-              <a:rPr sz="2000">
-                <a:solidFill>
-                  <a:srgbClr val="4A4A4A"/>
-                </a:solidFill>
-              </a:rPr>
-              <a:t>  Checar links, pedir autochecagem, revisar</a:t>
-            </a:r>
-          </a:p>
-          <a:p>
-            <a:pPr>
-              <a:spcAft>
-                <a:spcPts val="800"/>
-              </a:spcAft>
-            </a:pPr>
-          </a:p>
-          <a:p>
-            <a:pPr>
-              <a:spcAft>
-                <a:spcPts val="800"/>
-              </a:spcAft>
-            </a:pPr>
-            <a:r>
-              <a:rPr sz="2000">
-                <a:solidFill>
-                  <a:srgbClr val="4A4A4A"/>
+              <a:rPr lang="pt-BR" sz="1800" b="1" dirty="0">
+                <a:solidFill>
+                  <a:srgbClr val="333333"/>
                 </a:solidFill>
               </a:rPr>
               <a:t>INDIVIDUAL — Instrutor circula e monitora chat</a:t>

</xml_diff>